<commit_message>
Updated trail viz with trail types
</commit_message>
<xml_diff>
--- a/HikingPresentation.pptx
+++ b/HikingPresentation.pptx
@@ -10677,10 +10677,10 @@
       </p:sp>
       <p:pic>
         <p:nvPicPr>
-          <p:cNvPr id="7" name="Content Placeholder 6" descr="Chart, bar chart&#10;&#10;Description automatically generated">
+          <p:cNvPr id="9" name="Content Placeholder 8">
             <a:extLst>
               <a:ext uri="{FF2B5EF4-FFF2-40B4-BE49-F238E27FC236}">
-                <a16:creationId xmlns:a16="http://schemas.microsoft.com/office/drawing/2014/main" id="{EC7D6BC5-AA1F-4799-6135-9839B6910D3D}"/>
+                <a16:creationId xmlns:a16="http://schemas.microsoft.com/office/drawing/2014/main" id="{EDC953D7-7DE3-A699-2487-C764DE4B6136}"/>
               </a:ext>
             </a:extLst>
           </p:cNvPr>
@@ -10699,9 +10699,12 @@
         </p:blipFill>
         <p:spPr>
           <a:xfrm>
-            <a:off x="2211788" y="1928813"/>
-            <a:ext cx="7768423" cy="4252912"/>
+            <a:off x="2345724" y="1857116"/>
+            <a:ext cx="7500551" cy="4896857"/>
           </a:xfrm>
+          <a:prstGeom prst="rect">
+            <a:avLst/>
+          </a:prstGeom>
         </p:spPr>
       </p:pic>
     </p:spTree>

</xml_diff>